<commit_message>
modif la presentation meteoscop.pptx
</commit_message>
<xml_diff>
--- a/meteoscop.pptx
+++ b/meteoscop.pptx
@@ -117,6 +117,11 @@
       </a:defRPr>
     </a:lvl9pPr>
   </p:defaultTextStyle>
+  <p:extLst>
+    <p:ext uri="{EFAFB233-063F-42B5-8137-9DF3F51BA10A}">
+      <p15:sldGuideLst xmlns:p15="http://schemas.microsoft.com/office/powerpoint/2012/main"/>
+    </p:ext>
+  </p:extLst>
 </p:presentation>
 </file>
 
@@ -202,7 +207,7 @@
           <a:p>
             <a:fld id="{142F5C72-C786-4D88-8893-42291094D1B1}" type="datetimeFigureOut">
               <a:rPr lang="fr-FR" smtClean="0"/>
-              <a:t>16/06/2025</a:t>
+              <a:t>17/06/2025</a:t>
             </a:fld>
             <a:endParaRPr lang="fr-FR"/>
           </a:p>
@@ -469,6 +474,338 @@
 </p:notesMaster>
 </file>
 
+<file path=ppt/notesSlides/notesSlide1.xml><?xml version="1.0" encoding="utf-8"?>
+<p:notes xmlns:a="http://schemas.openxmlformats.org/drawingml/2006/main" xmlns:r="http://schemas.openxmlformats.org/officeDocument/2006/relationships" xmlns:p="http://schemas.openxmlformats.org/presentationml/2006/main">
+  <p:cSld>
+    <p:spTree>
+      <p:nvGrpSpPr>
+        <p:cNvPr id="1" name=""/>
+        <p:cNvGrpSpPr/>
+        <p:nvPr/>
+      </p:nvGrpSpPr>
+      <p:grpSpPr>
+        <a:xfrm>
+          <a:off x="0" y="0"/>
+          <a:ext cx="0" cy="0"/>
+          <a:chOff x="0" y="0"/>
+          <a:chExt cx="0" cy="0"/>
+        </a:xfrm>
+      </p:grpSpPr>
+      <p:sp>
+        <p:nvSpPr>
+          <p:cNvPr id="2" name="Espace réservé de l'image des diapositives 1"/>
+          <p:cNvSpPr>
+            <a:spLocks noGrp="1" noRot="1" noChangeAspect="1"/>
+          </p:cNvSpPr>
+          <p:nvPr>
+            <p:ph type="sldImg"/>
+          </p:nvPr>
+        </p:nvSpPr>
+        <p:spPr/>
+      </p:sp>
+      <p:sp>
+        <p:nvSpPr>
+          <p:cNvPr id="3" name="Espace réservé des notes 2"/>
+          <p:cNvSpPr>
+            <a:spLocks noGrp="1"/>
+          </p:cNvSpPr>
+          <p:nvPr>
+            <p:ph type="body" idx="1"/>
+          </p:nvPr>
+        </p:nvSpPr>
+        <p:spPr/>
+        <p:txBody>
+          <a:bodyPr/>
+          <a:lstStyle/>
+          <a:p>
+            <a:r>
+              <a:rPr lang="fr-FR" b="1" dirty="0"/>
+              <a:t>HTML5 : </a:t>
+            </a:r>
+            <a:r>
+              <a:rPr lang="fr-FR" dirty="0"/>
+              <a:t>Structure sémantique de l'interface.</a:t>
+            </a:r>
+          </a:p>
+          <a:p>
+            <a:r>
+              <a:rPr lang="fr-FR" b="1" dirty="0"/>
+              <a:t>CSS3 : </a:t>
+            </a:r>
+            <a:r>
+              <a:rPr lang="fr-FR" dirty="0"/>
+              <a:t>Stylisation, mise en page </a:t>
+            </a:r>
+            <a:r>
+              <a:rPr lang="fr-FR" b="1" dirty="0"/>
+              <a:t>(</a:t>
+            </a:r>
+            <a:r>
+              <a:rPr lang="fr-FR" b="1" dirty="0" err="1"/>
+              <a:t>Flexbox</a:t>
+            </a:r>
+            <a:r>
+              <a:rPr lang="fr-FR" b="1" dirty="0"/>
+              <a:t>/</a:t>
+            </a:r>
+            <a:r>
+              <a:rPr lang="fr-FR" b="1" dirty="0" err="1"/>
+              <a:t>Grid</a:t>
+            </a:r>
+            <a:r>
+              <a:rPr lang="fr-FR" b="1" dirty="0"/>
+              <a:t>)</a:t>
+            </a:r>
+            <a:r>
+              <a:rPr lang="fr-FR" dirty="0"/>
+              <a:t>, et effet de </a:t>
+            </a:r>
+            <a:r>
+              <a:rPr lang="fr-FR" b="1" dirty="0"/>
+              <a:t>"</a:t>
+            </a:r>
+            <a:r>
+              <a:rPr lang="fr-FR" b="1" dirty="0" err="1"/>
+              <a:t>glassmorphism</a:t>
+            </a:r>
+            <a:r>
+              <a:rPr lang="fr-FR" b="1" dirty="0"/>
+              <a:t>"</a:t>
+            </a:r>
+            <a:r>
+              <a:rPr lang="fr-FR" dirty="0"/>
+              <a:t>.</a:t>
+            </a:r>
+          </a:p>
+          <a:p>
+            <a:r>
+              <a:rPr lang="fr-FR" b="1" dirty="0"/>
+              <a:t>JavaScript (ES6+) : </a:t>
+            </a:r>
+            <a:r>
+              <a:rPr lang="fr-FR" dirty="0"/>
+              <a:t>Logique applicative, interaction avec le </a:t>
+            </a:r>
+            <a:r>
+              <a:rPr lang="fr-FR" b="1" dirty="0"/>
+              <a:t>DOM</a:t>
+            </a:r>
+            <a:r>
+              <a:rPr lang="fr-FR" dirty="0"/>
+              <a:t>, requêtes </a:t>
+            </a:r>
+            <a:r>
+              <a:rPr lang="fr-FR" b="1" dirty="0"/>
+              <a:t>API</a:t>
+            </a:r>
+            <a:r>
+              <a:rPr lang="fr-FR" dirty="0"/>
+              <a:t>.</a:t>
+            </a:r>
+          </a:p>
+          <a:p>
+            <a:r>
+              <a:rPr lang="fr-FR" b="1" dirty="0"/>
+              <a:t>API </a:t>
+            </a:r>
+            <a:r>
+              <a:rPr lang="fr-FR" b="1" dirty="0" err="1"/>
+              <a:t>OpenWeatherMap</a:t>
+            </a:r>
+            <a:r>
+              <a:rPr lang="fr-FR" b="1" dirty="0"/>
+              <a:t> : </a:t>
+            </a:r>
+            <a:r>
+              <a:rPr lang="fr-FR" dirty="0"/>
+              <a:t>Source des données météorologiques en temps réel.</a:t>
+            </a:r>
+          </a:p>
+          <a:p>
+            <a:r>
+              <a:rPr lang="fr-FR" b="1" dirty="0"/>
+              <a:t>Git &amp; GitHub : </a:t>
+            </a:r>
+            <a:r>
+              <a:rPr lang="fr-FR" dirty="0"/>
+              <a:t>Gestion de version et collaboration.</a:t>
+            </a:r>
+          </a:p>
+          <a:p>
+            <a:endParaRPr lang="fr-FR" dirty="0"/>
+          </a:p>
+        </p:txBody>
+      </p:sp>
+      <p:sp>
+        <p:nvSpPr>
+          <p:cNvPr id="4" name="Espace réservé du numéro de diapositive 3"/>
+          <p:cNvSpPr>
+            <a:spLocks noGrp="1"/>
+          </p:cNvSpPr>
+          <p:nvPr>
+            <p:ph type="sldNum" sz="quarter" idx="5"/>
+          </p:nvPr>
+        </p:nvSpPr>
+        <p:spPr/>
+        <p:txBody>
+          <a:bodyPr/>
+          <a:lstStyle/>
+          <a:p>
+            <a:fld id="{C67B2DE1-3E82-48BE-A150-6465C8489B23}" type="slidenum">
+              <a:rPr lang="fr-FR" smtClean="0"/>
+              <a:t>3</a:t>
+            </a:fld>
+            <a:endParaRPr lang="fr-FR"/>
+          </a:p>
+        </p:txBody>
+      </p:sp>
+    </p:spTree>
+    <p:extLst>
+      <p:ext uri="{BB962C8B-B14F-4D97-AF65-F5344CB8AC3E}">
+        <p14:creationId xmlns:p14="http://schemas.microsoft.com/office/powerpoint/2010/main" val="3396214582"/>
+      </p:ext>
+    </p:extLst>
+  </p:cSld>
+  <p:clrMapOvr>
+    <a:masterClrMapping/>
+  </p:clrMapOvr>
+</p:notes>
+</file>
+
+<file path=ppt/notesSlides/notesSlide2.xml><?xml version="1.0" encoding="utf-8"?>
+<p:notes xmlns:a="http://schemas.openxmlformats.org/drawingml/2006/main" xmlns:r="http://schemas.openxmlformats.org/officeDocument/2006/relationships" xmlns:p="http://schemas.openxmlformats.org/presentationml/2006/main">
+  <p:cSld>
+    <p:spTree>
+      <p:nvGrpSpPr>
+        <p:cNvPr id="1" name=""/>
+        <p:cNvGrpSpPr/>
+        <p:nvPr/>
+      </p:nvGrpSpPr>
+      <p:grpSpPr>
+        <a:xfrm>
+          <a:off x="0" y="0"/>
+          <a:ext cx="0" cy="0"/>
+          <a:chOff x="0" y="0"/>
+          <a:chExt cx="0" cy="0"/>
+        </a:xfrm>
+      </p:grpSpPr>
+      <p:sp>
+        <p:nvSpPr>
+          <p:cNvPr id="2" name="Espace réservé de l'image des diapositives 1"/>
+          <p:cNvSpPr>
+            <a:spLocks noGrp="1" noRot="1" noChangeAspect="1"/>
+          </p:cNvSpPr>
+          <p:nvPr>
+            <p:ph type="sldImg"/>
+          </p:nvPr>
+        </p:nvSpPr>
+        <p:spPr/>
+      </p:sp>
+      <p:sp>
+        <p:nvSpPr>
+          <p:cNvPr id="3" name="Espace réservé des notes 2"/>
+          <p:cNvSpPr>
+            <a:spLocks noGrp="1"/>
+          </p:cNvSpPr>
+          <p:nvPr>
+            <p:ph type="body" idx="1"/>
+          </p:nvPr>
+        </p:nvSpPr>
+        <p:spPr/>
+        <p:txBody>
+          <a:bodyPr/>
+          <a:lstStyle/>
+          <a:p>
+            <a:r>
+              <a:rPr lang="fr-FR" b="1" dirty="0"/>
+              <a:t>Gestion des erreurs avancée : </a:t>
+            </a:r>
+            <a:r>
+              <a:rPr lang="fr-FR" dirty="0"/>
+              <a:t>Messages d'erreur plus précis (ville introuvable, API non disponible).</a:t>
+            </a:r>
+          </a:p>
+          <a:p>
+            <a:r>
+              <a:rPr lang="fr-FR" b="1" dirty="0"/>
+              <a:t>Informations détaillées : </a:t>
+            </a:r>
+            <a:r>
+              <a:rPr lang="fr-FR" dirty="0"/>
+              <a:t>Ajout de la visibilité, heures de lever/coucher du soleil.</a:t>
+            </a:r>
+          </a:p>
+          <a:p>
+            <a:r>
+              <a:rPr lang="fr-FR" b="1" dirty="0"/>
+              <a:t>Icônes et fonds dynamiques : </a:t>
+            </a:r>
+            <a:r>
+              <a:rPr lang="fr-FR" dirty="0"/>
+              <a:t>Changer l'icône et l'image de fond en fonction des conditions météo.</a:t>
+            </a:r>
+          </a:p>
+          <a:p>
+            <a:r>
+              <a:rPr lang="fr-FR" b="1" dirty="0"/>
+              <a:t>Design Responsive : </a:t>
+            </a:r>
+            <a:r>
+              <a:rPr lang="fr-FR" dirty="0"/>
+              <a:t>Adaptation de l'interface aux différentes tailles d'écrans.</a:t>
+            </a:r>
+          </a:p>
+          <a:p>
+            <a:r>
+              <a:rPr lang="fr-FR" b="1" dirty="0"/>
+              <a:t>Optimisation (Cache API) : </a:t>
+            </a:r>
+            <a:r>
+              <a:rPr lang="fr-FR" dirty="0"/>
+              <a:t>Mise en cache des données météo pour réduire les appels API.</a:t>
+            </a:r>
+          </a:p>
+          <a:p>
+            <a:endParaRPr lang="fr-FR" dirty="0"/>
+          </a:p>
+        </p:txBody>
+      </p:sp>
+      <p:sp>
+        <p:nvSpPr>
+          <p:cNvPr id="4" name="Espace réservé du numéro de diapositive 3"/>
+          <p:cNvSpPr>
+            <a:spLocks noGrp="1"/>
+          </p:cNvSpPr>
+          <p:nvPr>
+            <p:ph type="sldNum" sz="quarter" idx="5"/>
+          </p:nvPr>
+        </p:nvSpPr>
+        <p:spPr/>
+        <p:txBody>
+          <a:bodyPr/>
+          <a:lstStyle/>
+          <a:p>
+            <a:fld id="{C67B2DE1-3E82-48BE-A150-6465C8489B23}" type="slidenum">
+              <a:rPr lang="fr-FR" smtClean="0"/>
+              <a:t>7</a:t>
+            </a:fld>
+            <a:endParaRPr lang="fr-FR"/>
+          </a:p>
+        </p:txBody>
+      </p:sp>
+    </p:spTree>
+    <p:extLst>
+      <p:ext uri="{BB962C8B-B14F-4D97-AF65-F5344CB8AC3E}">
+        <p14:creationId xmlns:p14="http://schemas.microsoft.com/office/powerpoint/2010/main" val="42223646"/>
+      </p:ext>
+    </p:extLst>
+  </p:cSld>
+  <p:clrMapOvr>
+    <a:masterClrMapping/>
+  </p:clrMapOvr>
+</p:notes>
+</file>
+
 <file path=ppt/slideLayouts/slideLayout1.xml><?xml version="1.0" encoding="utf-8"?>
 <p:sldLayout xmlns:a="http://schemas.openxmlformats.org/drawingml/2006/main" xmlns:r="http://schemas.openxmlformats.org/officeDocument/2006/relationships" xmlns:p="http://schemas.openxmlformats.org/presentationml/2006/main" type="title" preserve="1">
   <p:cSld name="Diapositive de titre">
@@ -616,7 +953,7 @@
           <a:p>
             <a:fld id="{6AA4FF51-F700-4552-BE13-320CE40A7FB6}" type="datetime1">
               <a:rPr lang="fr-FR" smtClean="0"/>
-              <a:t>16/06/2025</a:t>
+              <a:t>17/06/2025</a:t>
             </a:fld>
             <a:endParaRPr lang="fr-FR"/>
           </a:p>
@@ -814,7 +1151,7 @@
           <a:p>
             <a:fld id="{89AE48E9-72DA-4F2E-85E1-0F45106E2397}" type="datetime1">
               <a:rPr lang="fr-FR" smtClean="0"/>
-              <a:t>16/06/2025</a:t>
+              <a:t>17/06/2025</a:t>
             </a:fld>
             <a:endParaRPr lang="fr-FR"/>
           </a:p>
@@ -1022,7 +1359,7 @@
           <a:p>
             <a:fld id="{E6DE3FC9-7511-4089-BD95-CCFB6275AF86}" type="datetime1">
               <a:rPr lang="fr-FR" smtClean="0"/>
-              <a:t>16/06/2025</a:t>
+              <a:t>17/06/2025</a:t>
             </a:fld>
             <a:endParaRPr lang="fr-FR"/>
           </a:p>
@@ -1220,7 +1557,7 @@
           <a:p>
             <a:fld id="{EF304CA3-CD56-4CBF-8C9D-82918D79551F}" type="datetime1">
               <a:rPr lang="fr-FR" smtClean="0"/>
-              <a:t>16/06/2025</a:t>
+              <a:t>17/06/2025</a:t>
             </a:fld>
             <a:endParaRPr lang="fr-FR"/>
           </a:p>
@@ -1495,7 +1832,7 @@
           <a:p>
             <a:fld id="{C1667A52-B9F4-4D8B-937B-23F188D15D8C}" type="datetime1">
               <a:rPr lang="fr-FR" smtClean="0"/>
-              <a:t>16/06/2025</a:t>
+              <a:t>17/06/2025</a:t>
             </a:fld>
             <a:endParaRPr lang="fr-FR"/>
           </a:p>
@@ -1760,7 +2097,7 @@
           <a:p>
             <a:fld id="{8DEA83E0-AB23-4414-BB71-0DFAC5CE4F66}" type="datetime1">
               <a:rPr lang="fr-FR" smtClean="0"/>
-              <a:t>16/06/2025</a:t>
+              <a:t>17/06/2025</a:t>
             </a:fld>
             <a:endParaRPr lang="fr-FR"/>
           </a:p>
@@ -2172,7 +2509,7 @@
           <a:p>
             <a:fld id="{75F0503B-C422-436F-88F6-27FA8E41843C}" type="datetime1">
               <a:rPr lang="fr-FR" smtClean="0"/>
-              <a:t>16/06/2025</a:t>
+              <a:t>17/06/2025</a:t>
             </a:fld>
             <a:endParaRPr lang="fr-FR"/>
           </a:p>
@@ -2313,7 +2650,7 @@
           <a:p>
             <a:fld id="{1E3AAAA7-5A7F-4B5E-8B25-C382809F84AC}" type="datetime1">
               <a:rPr lang="fr-FR" smtClean="0"/>
-              <a:t>16/06/2025</a:t>
+              <a:t>17/06/2025</a:t>
             </a:fld>
             <a:endParaRPr lang="fr-FR"/>
           </a:p>
@@ -2426,7 +2763,7 @@
           <a:p>
             <a:fld id="{8FC29D5B-2AE0-4800-8423-D4075073CAAB}" type="datetime1">
               <a:rPr lang="fr-FR" smtClean="0"/>
-              <a:t>16/06/2025</a:t>
+              <a:t>17/06/2025</a:t>
             </a:fld>
             <a:endParaRPr lang="fr-FR"/>
           </a:p>
@@ -2737,7 +3074,7 @@
           <a:p>
             <a:fld id="{F48317D6-B874-42B3-8059-DF66D09721AF}" type="datetime1">
               <a:rPr lang="fr-FR" smtClean="0"/>
-              <a:t>16/06/2025</a:t>
+              <a:t>17/06/2025</a:t>
             </a:fld>
             <a:endParaRPr lang="fr-FR"/>
           </a:p>
@@ -3025,7 +3362,7 @@
           <a:p>
             <a:fld id="{B7BC50FA-788E-4654-A822-2C6EE9213D0E}" type="datetime1">
               <a:rPr lang="fr-FR" smtClean="0"/>
-              <a:t>16/06/2025</a:t>
+              <a:t>17/06/2025</a:t>
             </a:fld>
             <a:endParaRPr lang="fr-FR"/>
           </a:p>
@@ -3266,7 +3603,7 @@
           <a:p>
             <a:fld id="{0C1D46B1-9EB5-4BCC-8D6F-911E1E712312}" type="datetime1">
               <a:rPr lang="fr-FR" smtClean="0"/>
-              <a:t>16/06/2025</a:t>
+              <a:t>17/06/2025</a:t>
             </a:fld>
             <a:endParaRPr lang="fr-FR"/>
           </a:p>
@@ -3707,7 +4044,7 @@
           <a:p>
             <a:r>
               <a:rPr lang="fr-FR" b="1" dirty="0" err="1"/>
-              <a:t>MétéoScop</a:t>
+              <a:t>MétéoScope</a:t>
             </a:r>
             <a:endParaRPr lang="fr-FR" b="1" dirty="0"/>
           </a:p>
@@ -4518,12 +4855,6 @@
           <a:p>
             <a:r>
               <a:rPr lang="fr-FR" sz="1700" dirty="0"/>
-              <a:t>Projet de préparation pour la formation Concepteur Développeur d’Applications.</a:t>
-            </a:r>
-          </a:p>
-          <a:p>
-            <a:r>
-              <a:rPr lang="fr-FR" sz="1700" dirty="0"/>
               <a:t>Contrainte clé : Localisation de la météo définie via un fichier de configuration (</a:t>
             </a:r>
             <a:r>
@@ -4596,7 +4927,7 @@
           <a:p>
             <a:fld id="{2EEEA2C8-6872-4338-9AC5-14FE25F7374D}" type="datetime1">
               <a:rPr lang="fr-FR" smtClean="0"/>
-              <a:t>16/06/2025</a:t>
+              <a:t>17/06/2025</a:t>
             </a:fld>
             <a:endParaRPr lang="fr-FR"/>
           </a:p>
@@ -4707,121 +5038,47 @@
         </p:nvSpPr>
         <p:spPr/>
         <p:txBody>
-          <a:bodyPr/>
-          <a:lstStyle/>
-          <a:p>
-            <a:r>
-              <a:rPr lang="fr-FR" b="1" dirty="0"/>
-              <a:t>HTML5 : </a:t>
-            </a:r>
-            <a:r>
-              <a:rPr lang="fr-FR" dirty="0"/>
-              <a:t>Structure sémantique de l'interface.</a:t>
-            </a:r>
-          </a:p>
-          <a:p>
-            <a:r>
-              <a:rPr lang="fr-FR" b="1" dirty="0"/>
-              <a:t>CSS3 : </a:t>
-            </a:r>
-            <a:r>
-              <a:rPr lang="fr-FR" dirty="0"/>
-              <a:t>Stylisation, mise en page </a:t>
-            </a:r>
-            <a:r>
-              <a:rPr lang="fr-FR" b="1" dirty="0"/>
-              <a:t>(</a:t>
-            </a:r>
-            <a:r>
-              <a:rPr lang="fr-FR" b="1" dirty="0" err="1"/>
-              <a:t>Flexbox</a:t>
-            </a:r>
-            <a:r>
-              <a:rPr lang="fr-FR" b="1" dirty="0"/>
-              <a:t>/</a:t>
-            </a:r>
-            <a:r>
-              <a:rPr lang="fr-FR" b="1" dirty="0" err="1"/>
-              <a:t>Grid</a:t>
-            </a:r>
-            <a:r>
-              <a:rPr lang="fr-FR" b="1" dirty="0"/>
-              <a:t>)</a:t>
-            </a:r>
-            <a:r>
-              <a:rPr lang="fr-FR" dirty="0"/>
-              <a:t>, et effet de </a:t>
-            </a:r>
-            <a:r>
-              <a:rPr lang="fr-FR" b="1" dirty="0"/>
-              <a:t>"</a:t>
-            </a:r>
-            <a:r>
-              <a:rPr lang="fr-FR" b="1" dirty="0" err="1"/>
-              <a:t>glassmorphism</a:t>
-            </a:r>
-            <a:r>
-              <a:rPr lang="fr-FR" b="1" dirty="0"/>
-              <a:t>"</a:t>
-            </a:r>
-            <a:r>
-              <a:rPr lang="fr-FR" dirty="0"/>
-              <a:t>.</a:t>
-            </a:r>
-          </a:p>
-          <a:p>
-            <a:r>
-              <a:rPr lang="fr-FR" b="1" dirty="0"/>
-              <a:t>JavaScript (ES6+) : </a:t>
-            </a:r>
-            <a:r>
-              <a:rPr lang="fr-FR" dirty="0"/>
-              <a:t>Logique applicative, interaction avec le </a:t>
-            </a:r>
-            <a:r>
-              <a:rPr lang="fr-FR" b="1" dirty="0"/>
-              <a:t>DOM</a:t>
-            </a:r>
-            <a:r>
-              <a:rPr lang="fr-FR" dirty="0"/>
-              <a:t>, requêtes </a:t>
-            </a:r>
-            <a:r>
-              <a:rPr lang="fr-FR" b="1" dirty="0"/>
-              <a:t>API</a:t>
-            </a:r>
-            <a:r>
-              <a:rPr lang="fr-FR" dirty="0"/>
-              <a:t>.</a:t>
-            </a:r>
-          </a:p>
-          <a:p>
-            <a:r>
-              <a:rPr lang="fr-FR" b="1" dirty="0"/>
+          <a:bodyPr>
+            <a:normAutofit/>
+          </a:bodyPr>
+          <a:lstStyle/>
+          <a:p>
+            <a:r>
+              <a:rPr lang="fr-FR" sz="3600" b="1" dirty="0"/>
+              <a:t>HTML </a:t>
+            </a:r>
+          </a:p>
+          <a:p>
+            <a:r>
+              <a:rPr lang="fr-FR" sz="3600" b="1" dirty="0"/>
+              <a:t>CSS</a:t>
+            </a:r>
+            <a:endParaRPr lang="fr-FR" sz="3600" dirty="0"/>
+          </a:p>
+          <a:p>
+            <a:r>
+              <a:rPr lang="fr-FR" sz="3600" b="1" dirty="0"/>
+              <a:t>JavaScript</a:t>
+            </a:r>
+            <a:endParaRPr lang="fr-FR" sz="3600" dirty="0"/>
+          </a:p>
+          <a:p>
+            <a:r>
+              <a:rPr lang="fr-FR" sz="3600" b="1" dirty="0"/>
               <a:t>API </a:t>
             </a:r>
             <a:r>
-              <a:rPr lang="fr-FR" b="1" dirty="0" err="1"/>
+              <a:rPr lang="fr-FR" sz="3600" b="1" dirty="0" err="1"/>
               <a:t>OpenWeatherMap</a:t>
             </a:r>
-            <a:r>
-              <a:rPr lang="fr-FR" b="1" dirty="0"/>
-              <a:t> : </a:t>
-            </a:r>
-            <a:r>
-              <a:rPr lang="fr-FR" dirty="0"/>
-              <a:t>Source des données météorologiques en temps réel.</a:t>
-            </a:r>
-          </a:p>
-          <a:p>
-            <a:r>
-              <a:rPr lang="fr-FR" b="1" dirty="0"/>
-              <a:t>Git &amp; GitHub : </a:t>
-            </a:r>
-            <a:r>
-              <a:rPr lang="fr-FR" dirty="0"/>
-              <a:t>Gestion de version et collaboration.</a:t>
-            </a:r>
+            <a:endParaRPr lang="fr-FR" sz="3600" dirty="0"/>
+          </a:p>
+          <a:p>
+            <a:r>
+              <a:rPr lang="fr-FR" sz="3600" b="1" dirty="0"/>
+              <a:t>Git &amp; GitHub</a:t>
+            </a:r>
+            <a:endParaRPr lang="fr-FR" sz="3600" dirty="0"/>
           </a:p>
         </p:txBody>
       </p:sp>
@@ -4848,7 +5105,7 @@
           <a:p>
             <a:fld id="{E5642936-C5D2-4E07-B75A-8C0574AD4867}" type="datetime1">
               <a:rPr lang="fr-FR" smtClean="0"/>
-              <a:t>16/06/2025</a:t>
+              <a:t>17/06/2025</a:t>
             </a:fld>
             <a:endParaRPr lang="fr-FR"/>
           </a:p>
@@ -5136,7 +5393,15 @@
             </a:r>
             <a:r>
               <a:rPr lang="fr-FR" dirty="0"/>
-              <a:t> pour rafraîchir les données chaque heure.</a:t>
+              <a:t> pour rafraîchir les données </a:t>
+            </a:r>
+            <a:r>
+              <a:rPr lang="fr-FR" u="sng" dirty="0"/>
+              <a:t>chaque heure</a:t>
+            </a:r>
+            <a:r>
+              <a:rPr lang="fr-FR" dirty="0"/>
+              <a:t>.</a:t>
             </a:r>
           </a:p>
           <a:p>
@@ -5200,7 +5465,7 @@
           <a:p>
             <a:fld id="{7D68DED3-DC06-48EA-9EC2-9C8AFDC0EB8D}" type="datetime1">
               <a:rPr lang="fr-FR" smtClean="0"/>
-              <a:t>16/06/2025</a:t>
+              <a:t>17/06/2025</a:t>
             </a:fld>
             <a:endParaRPr lang="fr-FR"/>
           </a:p>
@@ -5504,7 +5769,7 @@
           <a:p>
             <a:fld id="{EF304CA3-CD56-4CBF-8C9D-82918D79551F}" type="datetime1">
               <a:rPr lang="fr-FR" smtClean="0"/>
-              <a:t>16/06/2025</a:t>
+              <a:t>17/06/2025</a:t>
             </a:fld>
             <a:endParaRPr lang="fr-FR"/>
           </a:p>
@@ -5736,7 +6001,7 @@
           <a:p>
             <a:fld id="{EF304CA3-CD56-4CBF-8C9D-82918D79551F}" type="datetime1">
               <a:rPr lang="fr-FR" smtClean="0"/>
-              <a:t>16/06/2025</a:t>
+              <a:t>17/06/2025</a:t>
             </a:fld>
             <a:endParaRPr lang="fr-FR"/>
           </a:p>
@@ -5868,7 +6133,7 @@
             </a:r>
             <a:r>
               <a:rPr lang="fr-FR" dirty="0"/>
-              <a:t>Ajout de la visibilité, point de rosée, heures de lever/coucher du soleil.</a:t>
+              <a:t>Ajout de la visibilité, heures de lever/coucher du soleil.</a:t>
             </a:r>
           </a:p>
           <a:p>

</xml_diff>